<commit_message>
removed an unnecessary comment from method emit() for class AddingExpr
</commit_message>
<xml_diff>
--- a/PowerPoint Slides/11 - Code Generation.pptx
+++ b/PowerPoint Slides/11 - Code Generation.pptx
@@ -65,7 +65,7 @@
     <p:sldId id="306" r:id="rId53"/>
   </p:sldIdLst>
   <p:sldSz cx="9144000" cy="6858000" type="screen4x3"/>
-  <p:notesSz cx="7315200" cy="9601200"/>
+  <p:notesSz cx="7010400" cy="9296400"/>
   <p:defaultTextStyle>
     <a:defPPr>
       <a:defRPr lang="en-US"/>
@@ -208,12 +208,12 @@
     </p:ext>
     <p:ext uri="{2D200454-40CA-4A62-9FC3-DE9A4176ACB9}">
       <p15:notesGuideLst xmlns:p15="http://schemas.microsoft.com/office/powerpoint/2012/main">
-        <p15:guide id="1" orient="horz" pos="3024" userDrawn="1">
+        <p15:guide id="1" orient="horz" pos="2928" userDrawn="1">
           <p15:clr>
             <a:srgbClr val="A4A3A4"/>
           </p15:clr>
         </p15:guide>
-        <p15:guide id="2" pos="2304" userDrawn="1">
+        <p15:guide id="2" pos="2208" userDrawn="1">
           <p15:clr>
             <a:srgbClr val="A4A3A4"/>
           </p15:clr>
@@ -261,8 +261,8 @@
         </p:nvSpPr>
         <p:spPr bwMode="auto">
           <a:xfrm>
-            <a:off x="4144618" y="0"/>
-            <a:ext cx="3170583" cy="480388"/>
+            <a:off x="3971926" y="0"/>
+            <a:ext cx="3038475" cy="465138"/>
           </a:xfrm>
           <a:prstGeom prst="rect">
             <a:avLst/>
@@ -277,13 +277,13 @@
           <a:effectLst/>
         </p:spPr>
         <p:txBody>
-          <a:bodyPr vert="horz" wrap="square" lIns="96653" tIns="48327" rIns="96653" bIns="48327" numCol="1" anchor="t" anchorCtr="0" compatLnSpc="1">
+          <a:bodyPr vert="horz" wrap="square" lIns="93164" tIns="46582" rIns="93164" bIns="46582" numCol="1" anchor="t" anchorCtr="0" compatLnSpc="1">
             <a:prstTxWarp prst="textNoShape">
               <a:avLst/>
             </a:prstTxWarp>
           </a:bodyPr>
           <a:lstStyle>
-            <a:lvl1pPr algn="r" defTabSz="966621">
+            <a:lvl1pPr algn="r" defTabSz="931726">
               <a:defRPr sz="1200"/>
             </a:lvl1pPr>
           </a:lstStyle>
@@ -312,8 +312,8 @@
         </p:nvSpPr>
         <p:spPr bwMode="auto">
           <a:xfrm>
-            <a:off x="4144618" y="9120813"/>
-            <a:ext cx="3170583" cy="480387"/>
+            <a:off x="3971926" y="8831264"/>
+            <a:ext cx="3038475" cy="465137"/>
           </a:xfrm>
           <a:prstGeom prst="rect">
             <a:avLst/>
@@ -328,13 +328,13 @@
           <a:effectLst/>
         </p:spPr>
         <p:txBody>
-          <a:bodyPr vert="horz" wrap="square" lIns="96653" tIns="48327" rIns="96653" bIns="48327" numCol="1" anchor="b" anchorCtr="0" compatLnSpc="1">
+          <a:bodyPr vert="horz" wrap="square" lIns="93164" tIns="46582" rIns="93164" bIns="46582" numCol="1" anchor="b" anchorCtr="0" compatLnSpc="1">
             <a:prstTxWarp prst="textNoShape">
               <a:avLst/>
             </a:prstTxWarp>
           </a:bodyPr>
           <a:lstStyle>
-            <a:lvl1pPr algn="r" defTabSz="966621">
+            <a:lvl1pPr algn="r" defTabSz="931726">
               <a:defRPr sz="1200"/>
             </a:lvl1pPr>
           </a:lstStyle>
@@ -411,8 +411,8 @@
         </p:nvSpPr>
         <p:spPr bwMode="auto">
           <a:xfrm>
-            <a:off x="0" y="0"/>
-            <a:ext cx="3170583" cy="480388"/>
+            <a:off x="1" y="0"/>
+            <a:ext cx="3038475" cy="465138"/>
           </a:xfrm>
           <a:prstGeom prst="rect">
             <a:avLst/>
@@ -427,13 +427,13 @@
           <a:effectLst/>
         </p:spPr>
         <p:txBody>
-          <a:bodyPr vert="horz" wrap="square" lIns="96653" tIns="48327" rIns="96653" bIns="48327" numCol="1" anchor="t" anchorCtr="0" compatLnSpc="1">
+          <a:bodyPr vert="horz" wrap="square" lIns="93164" tIns="46582" rIns="93164" bIns="46582" numCol="1" anchor="t" anchorCtr="0" compatLnSpc="1">
             <a:prstTxWarp prst="textNoShape">
               <a:avLst/>
             </a:prstTxWarp>
           </a:bodyPr>
           <a:lstStyle>
-            <a:lvl1pPr algn="l" defTabSz="966621">
+            <a:lvl1pPr algn="l" defTabSz="931726">
               <a:defRPr sz="1200"/>
             </a:lvl1pPr>
           </a:lstStyle>
@@ -460,8 +460,8 @@
         </p:nvSpPr>
         <p:spPr bwMode="auto">
           <a:xfrm>
-            <a:off x="4144618" y="0"/>
-            <a:ext cx="3170583" cy="480388"/>
+            <a:off x="3971926" y="0"/>
+            <a:ext cx="3038475" cy="465138"/>
           </a:xfrm>
           <a:prstGeom prst="rect">
             <a:avLst/>
@@ -476,13 +476,13 @@
           <a:effectLst/>
         </p:spPr>
         <p:txBody>
-          <a:bodyPr vert="horz" wrap="square" lIns="96653" tIns="48327" rIns="96653" bIns="48327" numCol="1" anchor="t" anchorCtr="0" compatLnSpc="1">
+          <a:bodyPr vert="horz" wrap="square" lIns="93164" tIns="46582" rIns="93164" bIns="46582" numCol="1" anchor="t" anchorCtr="0" compatLnSpc="1">
             <a:prstTxWarp prst="textNoShape">
               <a:avLst/>
             </a:prstTxWarp>
           </a:bodyPr>
           <a:lstStyle>
-            <a:lvl1pPr algn="r" defTabSz="966621">
+            <a:lvl1pPr algn="r" defTabSz="931726">
               <a:defRPr sz="1200"/>
             </a:lvl1pPr>
           </a:lstStyle>
@@ -506,8 +506,8 @@
         </p:nvSpPr>
         <p:spPr bwMode="auto">
           <a:xfrm>
-            <a:off x="1257300" y="719138"/>
-            <a:ext cx="4800600" cy="3600450"/>
+            <a:off x="1181100" y="696913"/>
+            <a:ext cx="4648200" cy="3486150"/>
           </a:xfrm>
           <a:prstGeom prst="rect">
             <a:avLst/>
@@ -535,8 +535,8 @@
         </p:nvSpPr>
         <p:spPr bwMode="auto">
           <a:xfrm>
-            <a:off x="975693" y="4561226"/>
-            <a:ext cx="5363817" cy="4320213"/>
+            <a:off x="935039" y="4416426"/>
+            <a:ext cx="5140325" cy="4183063"/>
           </a:xfrm>
           <a:prstGeom prst="rect">
             <a:avLst/>
@@ -551,7 +551,7 @@
           <a:effectLst/>
         </p:spPr>
         <p:txBody>
-          <a:bodyPr vert="horz" wrap="square" lIns="96653" tIns="48327" rIns="96653" bIns="48327" numCol="1" anchor="t" anchorCtr="0" compatLnSpc="1">
+          <a:bodyPr vert="horz" wrap="square" lIns="93164" tIns="46582" rIns="93164" bIns="46582" numCol="1" anchor="t" anchorCtr="0" compatLnSpc="1">
             <a:prstTxWarp prst="textNoShape">
               <a:avLst/>
             </a:prstTxWarp>
@@ -606,8 +606,8 @@
         </p:nvSpPr>
         <p:spPr bwMode="auto">
           <a:xfrm>
-            <a:off x="0" y="9120813"/>
-            <a:ext cx="3170583" cy="480387"/>
+            <a:off x="1" y="8831264"/>
+            <a:ext cx="3038475" cy="465137"/>
           </a:xfrm>
           <a:prstGeom prst="rect">
             <a:avLst/>
@@ -622,13 +622,13 @@
           <a:effectLst/>
         </p:spPr>
         <p:txBody>
-          <a:bodyPr vert="horz" wrap="square" lIns="96653" tIns="48327" rIns="96653" bIns="48327" numCol="1" anchor="b" anchorCtr="0" compatLnSpc="1">
+          <a:bodyPr vert="horz" wrap="square" lIns="93164" tIns="46582" rIns="93164" bIns="46582" numCol="1" anchor="b" anchorCtr="0" compatLnSpc="1">
             <a:prstTxWarp prst="textNoShape">
               <a:avLst/>
             </a:prstTxWarp>
           </a:bodyPr>
           <a:lstStyle>
-            <a:lvl1pPr algn="l" defTabSz="966621">
+            <a:lvl1pPr algn="l" defTabSz="931726">
               <a:defRPr sz="1200"/>
             </a:lvl1pPr>
           </a:lstStyle>
@@ -652,8 +652,8 @@
         </p:nvSpPr>
         <p:spPr bwMode="auto">
           <a:xfrm>
-            <a:off x="4144618" y="9120813"/>
-            <a:ext cx="3170583" cy="480387"/>
+            <a:off x="3971926" y="8831264"/>
+            <a:ext cx="3038475" cy="465137"/>
           </a:xfrm>
           <a:prstGeom prst="rect">
             <a:avLst/>
@@ -668,13 +668,13 @@
           <a:effectLst/>
         </p:spPr>
         <p:txBody>
-          <a:bodyPr vert="horz" wrap="square" lIns="96653" tIns="48327" rIns="96653" bIns="48327" numCol="1" anchor="b" anchorCtr="0" compatLnSpc="1">
+          <a:bodyPr vert="horz" wrap="square" lIns="93164" tIns="46582" rIns="93164" bIns="46582" numCol="1" anchor="b" anchorCtr="0" compatLnSpc="1">
             <a:prstTxWarp prst="textNoShape">
               <a:avLst/>
             </a:prstTxWarp>
           </a:bodyPr>
           <a:lstStyle>
-            <a:lvl1pPr algn="r" defTabSz="966621">
+            <a:lvl1pPr algn="r" defTabSz="931726">
               <a:defRPr sz="1200"/>
             </a:lvl1pPr>
           </a:lstStyle>
@@ -14228,35 +14228,6 @@
                 <a:latin typeface="Consolas" pitchFamily="49" charset="0"/>
                 <a:cs typeface="Consolas" pitchFamily="49" charset="0"/>
               </a:rPr>
-              <a:t>    ...  // assert that the operator is plus or minus</a:t>
-            </a:r>
-          </a:p>
-          <a:p>
-            <a:pPr marL="274320" indent="0">
-              <a:spcBef>
-                <a:spcPts val="100"/>
-              </a:spcBef>
-              <a:buFontTx/>
-              <a:buNone/>
-            </a:pPr>
-            <a:endParaRPr lang="en-US" sz="1800" dirty="0">
-              <a:latin typeface="Consolas" pitchFamily="49" charset="0"/>
-              <a:cs typeface="Consolas" pitchFamily="49" charset="0"/>
-            </a:endParaRPr>
-          </a:p>
-          <a:p>
-            <a:pPr marL="274320" indent="0">
-              <a:spcBef>
-                <a:spcPts val="100"/>
-              </a:spcBef>
-              <a:buFontTx/>
-              <a:buNone/>
-            </a:pPr>
-            <a:r>
-              <a:rPr lang="en-US" sz="1800" dirty="0">
-                <a:latin typeface="Consolas" pitchFamily="49" charset="0"/>
-                <a:cs typeface="Consolas" pitchFamily="49" charset="0"/>
-              </a:rPr>
               <a:t>    if (</a:t>
             </a:r>
             <a:r>
@@ -14271,21 +14242,7 @@
                 <a:latin typeface="Consolas" pitchFamily="49" charset="0"/>
                 <a:cs typeface="Consolas" pitchFamily="49" charset="0"/>
               </a:rPr>
-              <a:t> == </a:t>
-            </a:r>
-            <a:r>
-              <a:rPr lang="en-US" sz="1800" dirty="0" err="1">
-                <a:latin typeface="Consolas" pitchFamily="49" charset="0"/>
-                <a:cs typeface="Consolas" pitchFamily="49" charset="0"/>
-              </a:rPr>
-              <a:t>Symbol.plus</a:t>
-            </a:r>
-            <a:r>
-              <a:rPr lang="en-US" sz="1800" dirty="0">
-                <a:latin typeface="Consolas" pitchFamily="49" charset="0"/>
-                <a:cs typeface="Consolas" pitchFamily="49" charset="0"/>
-              </a:rPr>
-              <a:t>)</a:t>
+              <a:t> == Symbol.plus)</a:t>
             </a:r>
           </a:p>
           <a:p>

</xml_diff>